<commit_message>
new stuff for 4440
</commit_message>
<xml_diff>
--- a/assets/courses/malware/spring2017/slides/week01/Intro.pptx
+++ b/assets/courses/malware/spring2017/slides/week01/Intro.pptx
@@ -215,7 +215,7 @@
             <a:fld id="{9185E316-CC4C-4A5E-877F-F514162D5571}" type="datetimeFigureOut">
               <a:rPr lang="en-US" smtClean="0"/>
               <a:pPr/>
-              <a:t>1/17/17</a:t>
+              <a:t>1/18/17</a:t>
             </a:fld>
             <a:endParaRPr lang="en-US"/>
           </a:p>
@@ -2863,7 +2863,7 @@
             <a:fld id="{E84228D5-32E6-431B-9CFB-015DAFE43D66}" type="datetimeFigureOut">
               <a:rPr lang="en-US" smtClean="0"/>
               <a:pPr/>
-              <a:t>1/17/17</a:t>
+              <a:t>1/18/17</a:t>
             </a:fld>
             <a:endParaRPr lang="en-US"/>
           </a:p>
@@ -3030,7 +3030,7 @@
             <a:fld id="{E84228D5-32E6-431B-9CFB-015DAFE43D66}" type="datetimeFigureOut">
               <a:rPr lang="en-US" smtClean="0"/>
               <a:pPr/>
-              <a:t>1/17/17</a:t>
+              <a:t>1/18/17</a:t>
             </a:fld>
             <a:endParaRPr lang="en-US"/>
           </a:p>
@@ -3207,7 +3207,7 @@
             <a:fld id="{E84228D5-32E6-431B-9CFB-015DAFE43D66}" type="datetimeFigureOut">
               <a:rPr lang="en-US" smtClean="0"/>
               <a:pPr/>
-              <a:t>1/17/17</a:t>
+              <a:t>1/18/17</a:t>
             </a:fld>
             <a:endParaRPr lang="en-US"/>
           </a:p>
@@ -3431,7 +3431,7 @@
             <a:fld id="{E84228D5-32E6-431B-9CFB-015DAFE43D66}" type="datetimeFigureOut">
               <a:rPr lang="en-US" smtClean="0"/>
               <a:pPr/>
-              <a:t>1/17/17</a:t>
+              <a:t>1/18/17</a:t>
             </a:fld>
             <a:endParaRPr lang="en-US"/>
           </a:p>
@@ -3674,7 +3674,7 @@
             <a:fld id="{E84228D5-32E6-431B-9CFB-015DAFE43D66}" type="datetimeFigureOut">
               <a:rPr lang="en-US" smtClean="0"/>
               <a:pPr/>
-              <a:t>1/17/17</a:t>
+              <a:t>1/18/17</a:t>
             </a:fld>
             <a:endParaRPr lang="en-US"/>
           </a:p>
@@ -3959,7 +3959,7 @@
             <a:fld id="{E84228D5-32E6-431B-9CFB-015DAFE43D66}" type="datetimeFigureOut">
               <a:rPr lang="en-US" smtClean="0"/>
               <a:pPr/>
-              <a:t>1/17/17</a:t>
+              <a:t>1/18/17</a:t>
             </a:fld>
             <a:endParaRPr lang="en-US"/>
           </a:p>
@@ -4378,7 +4378,7 @@
             <a:fld id="{E84228D5-32E6-431B-9CFB-015DAFE43D66}" type="datetimeFigureOut">
               <a:rPr lang="en-US" smtClean="0"/>
               <a:pPr/>
-              <a:t>1/17/17</a:t>
+              <a:t>1/18/17</a:t>
             </a:fld>
             <a:endParaRPr lang="en-US"/>
           </a:p>
@@ -4493,7 +4493,7 @@
             <a:fld id="{E84228D5-32E6-431B-9CFB-015DAFE43D66}" type="datetimeFigureOut">
               <a:rPr lang="en-US" smtClean="0"/>
               <a:pPr/>
-              <a:t>1/17/17</a:t>
+              <a:t>1/18/17</a:t>
             </a:fld>
             <a:endParaRPr lang="en-US"/>
           </a:p>
@@ -4585,7 +4585,7 @@
             <a:fld id="{E84228D5-32E6-431B-9CFB-015DAFE43D66}" type="datetimeFigureOut">
               <a:rPr lang="en-US" smtClean="0"/>
               <a:pPr/>
-              <a:t>1/17/17</a:t>
+              <a:t>1/18/17</a:t>
             </a:fld>
             <a:endParaRPr lang="en-US"/>
           </a:p>
@@ -4859,7 +4859,7 @@
             <a:fld id="{E84228D5-32E6-431B-9CFB-015DAFE43D66}" type="datetimeFigureOut">
               <a:rPr lang="en-US" smtClean="0"/>
               <a:pPr/>
-              <a:t>1/17/17</a:t>
+              <a:t>1/18/17</a:t>
             </a:fld>
             <a:endParaRPr lang="en-US"/>
           </a:p>
@@ -5109,7 +5109,7 @@
             <a:fld id="{E84228D5-32E6-431B-9CFB-015DAFE43D66}" type="datetimeFigureOut">
               <a:rPr lang="en-US" smtClean="0"/>
               <a:pPr/>
-              <a:t>1/17/17</a:t>
+              <a:t>1/18/17</a:t>
             </a:fld>
             <a:endParaRPr lang="en-US"/>
           </a:p>
@@ -5319,7 +5319,7 @@
             <a:fld id="{E84228D5-32E6-431B-9CFB-015DAFE43D66}" type="datetimeFigureOut">
               <a:rPr lang="en-US" smtClean="0"/>
               <a:pPr/>
-              <a:t>1/17/17</a:t>
+              <a:t>1/18/17</a:t>
             </a:fld>
             <a:endParaRPr lang="en-US"/>
           </a:p>
@@ -7673,7 +7673,15 @@
             </a:pPr>
             <a:r>
               <a:rPr lang="en-US" sz="2800" dirty="0" smtClean="0"/>
-              <a:t>Final exam (30%)</a:t>
+              <a:t>Final exam (</a:t>
+            </a:r>
+            <a:r>
+              <a:rPr lang="en-US" sz="2800" dirty="0" smtClean="0"/>
+              <a:t>35%</a:t>
+            </a:r>
+            <a:r>
+              <a:rPr lang="en-US" sz="2800" dirty="0" smtClean="0"/>
+              <a:t>)</a:t>
             </a:r>
           </a:p>
           <a:p>
@@ -7685,15 +7693,23 @@
             </a:pPr>
             <a:r>
               <a:rPr lang="en-US" sz="2800" dirty="0" smtClean="0"/>
-              <a:t>Programming </a:t>
+              <a:t>Programming &amp; Homework Assignments </a:t>
             </a:r>
             <a:r>
               <a:rPr lang="en-US" sz="2800" dirty="0" smtClean="0"/>
-              <a:t>&amp; Homework Assignments (</a:t>
+              <a:t>(</a:t>
             </a:r>
             <a:r>
               <a:rPr lang="en-US" sz="2800" dirty="0" smtClean="0"/>
-              <a:t>25%)</a:t>
+              <a:t>15</a:t>
+            </a:r>
+            <a:r>
+              <a:rPr lang="en-US" sz="2800" dirty="0" smtClean="0"/>
+              <a:t>%</a:t>
+            </a:r>
+            <a:r>
+              <a:rPr lang="en-US" sz="2800" dirty="0" smtClean="0"/>
+              <a:t>)</a:t>
             </a:r>
           </a:p>
           <a:p>
@@ -7705,7 +7721,15 @@
             </a:pPr>
             <a:r>
               <a:rPr lang="en-US" sz="2800" dirty="0" smtClean="0"/>
-              <a:t>Class participation, pop quizzes (5%)</a:t>
+              <a:t>Class participation, pop quizzes </a:t>
+            </a:r>
+            <a:r>
+              <a:rPr lang="en-US" sz="2800" dirty="0" smtClean="0"/>
+              <a:t>(10%</a:t>
+            </a:r>
+            <a:r>
+              <a:rPr lang="en-US" sz="2800" dirty="0" smtClean="0"/>
+              <a:t>)</a:t>
             </a:r>
           </a:p>
           <a:p>
@@ -7717,7 +7741,15 @@
             </a:pPr>
             <a:r>
               <a:rPr lang="en-US" sz="2800" dirty="0" smtClean="0"/>
-              <a:t>Graduate Students: 20 minute presentation on malware related publication at end of class. More information later.</a:t>
+              <a:t>Graduate Students: </a:t>
+            </a:r>
+            <a:r>
+              <a:rPr lang="en-US" sz="2800" dirty="0" smtClean="0"/>
+              <a:t>25 </a:t>
+            </a:r>
+            <a:r>
+              <a:rPr lang="en-US" sz="2800" dirty="0" smtClean="0"/>
+              <a:t>minute presentation on malware related publication at end of class. More information later.</a:t>
             </a:r>
           </a:p>
         </p:txBody>
@@ -7995,11 +8027,7 @@
           <a:p>
             <a:r>
               <a:rPr lang="en-US" dirty="0" smtClean="0"/>
-              <a:t>You </a:t>
-            </a:r>
-            <a:r>
-              <a:rPr lang="en-US" dirty="0" smtClean="0"/>
-              <a:t>are able to accomplish such tasks as installing software completely on your own.</a:t>
+              <a:t>You are able to accomplish such tasks as installing software completely on your own.</a:t>
             </a:r>
           </a:p>
           <a:p>
@@ -8267,15 +8295,7 @@
           <a:p>
             <a:r>
               <a:rPr lang="en-US" dirty="0" smtClean="0"/>
-              <a:t>There </a:t>
-            </a:r>
-            <a:r>
-              <a:rPr lang="en-US" dirty="0" smtClean="0"/>
-              <a:t>will be neither trails of bread crumbs nor spoon feeding of </a:t>
-            </a:r>
-            <a:r>
-              <a:rPr lang="en-US" dirty="0" smtClean="0"/>
-              <a:t>material</a:t>
+              <a:t>There will be neither trails of bread crumbs nor spoon feeding of material</a:t>
             </a:r>
           </a:p>
           <a:p>
@@ -8868,7 +8888,15 @@
             </a:pPr>
             <a:r>
               <a:rPr lang="en-US" sz="2800" dirty="0" smtClean="0"/>
-              <a:t>Office Hours (318 EBN) – MW 4-5.</a:t>
+              <a:t>Office Hours (318 EBN) – </a:t>
+            </a:r>
+            <a:r>
+              <a:rPr lang="en-US" sz="2800" b="1" dirty="0" smtClean="0"/>
+              <a:t>by appointment only</a:t>
+            </a:r>
+            <a:r>
+              <a:rPr lang="en-US" sz="2800" dirty="0" smtClean="0"/>
+              <a:t>.</a:t>
             </a:r>
           </a:p>
           <a:p>
@@ -8879,8 +8907,9 @@
             </a:pPr>
             <a:r>
               <a:rPr lang="en-US" sz="2400" dirty="0" smtClean="0"/>
-              <a:t>if you’re planning to see me during office hours, best to let me know in advance</a:t>
-            </a:r>
+              <a:t>the “drop in” visit should be avoided at all costs.</a:t>
+            </a:r>
+            <a:endParaRPr lang="en-US" sz="2400" dirty="0" smtClean="0"/>
           </a:p>
         </p:txBody>
       </p:sp>

</xml_diff>